<commit_message>
add link to repo
</commit_message>
<xml_diff>
--- a/public/AllAboutReactivity.pptx
+++ b/public/AllAboutReactivity.pptx
@@ -289,7 +289,7 @@
           <a:p>
             <a:fld id="{B94C08E3-C689-4D6B-B707-E33CF0BCC676}" type="datetimeFigureOut">
               <a:rPr lang="en-US" smtClean="0"/>
-              <a:t>4/6/2015</a:t>
+              <a:t>4/8/2015</a:t>
             </a:fld>
             <a:endParaRPr lang="en-US" dirty="0"/>
           </a:p>
@@ -459,7 +459,7 @@
           <a:p>
             <a:fld id="{B94C08E3-C689-4D6B-B707-E33CF0BCC676}" type="datetimeFigureOut">
               <a:rPr lang="en-US" smtClean="0"/>
-              <a:t>4/6/2015</a:t>
+              <a:t>4/8/2015</a:t>
             </a:fld>
             <a:endParaRPr lang="en-US" dirty="0"/>
           </a:p>
@@ -639,7 +639,7 @@
           <a:p>
             <a:fld id="{B94C08E3-C689-4D6B-B707-E33CF0BCC676}" type="datetimeFigureOut">
               <a:rPr lang="en-US" smtClean="0"/>
-              <a:t>4/6/2015</a:t>
+              <a:t>4/8/2015</a:t>
             </a:fld>
             <a:endParaRPr lang="en-US" dirty="0"/>
           </a:p>
@@ -809,7 +809,7 @@
           <a:p>
             <a:fld id="{B94C08E3-C689-4D6B-B707-E33CF0BCC676}" type="datetimeFigureOut">
               <a:rPr lang="en-US" smtClean="0"/>
-              <a:t>4/6/2015</a:t>
+              <a:t>4/8/2015</a:t>
             </a:fld>
             <a:endParaRPr lang="en-US" dirty="0"/>
           </a:p>
@@ -1055,7 +1055,7 @@
           <a:p>
             <a:fld id="{B94C08E3-C689-4D6B-B707-E33CF0BCC676}" type="datetimeFigureOut">
               <a:rPr lang="en-US" smtClean="0"/>
-              <a:t>4/6/2015</a:t>
+              <a:t>4/8/2015</a:t>
             </a:fld>
             <a:endParaRPr lang="en-US" dirty="0"/>
           </a:p>
@@ -1343,7 +1343,7 @@
           <a:p>
             <a:fld id="{B94C08E3-C689-4D6B-B707-E33CF0BCC676}" type="datetimeFigureOut">
               <a:rPr lang="en-US" smtClean="0"/>
-              <a:t>4/6/2015</a:t>
+              <a:t>4/8/2015</a:t>
             </a:fld>
             <a:endParaRPr lang="en-US" dirty="0"/>
           </a:p>
@@ -1765,7 +1765,7 @@
           <a:p>
             <a:fld id="{B94C08E3-C689-4D6B-B707-E33CF0BCC676}" type="datetimeFigureOut">
               <a:rPr lang="en-US" smtClean="0"/>
-              <a:t>4/6/2015</a:t>
+              <a:t>4/8/2015</a:t>
             </a:fld>
             <a:endParaRPr lang="en-US" dirty="0"/>
           </a:p>
@@ -1883,7 +1883,7 @@
           <a:p>
             <a:fld id="{B94C08E3-C689-4D6B-B707-E33CF0BCC676}" type="datetimeFigureOut">
               <a:rPr lang="en-US" smtClean="0"/>
-              <a:t>4/6/2015</a:t>
+              <a:t>4/8/2015</a:t>
             </a:fld>
             <a:endParaRPr lang="en-US" dirty="0"/>
           </a:p>
@@ -1978,7 +1978,7 @@
           <a:p>
             <a:fld id="{B94C08E3-C689-4D6B-B707-E33CF0BCC676}" type="datetimeFigureOut">
               <a:rPr lang="en-US" smtClean="0"/>
-              <a:t>4/6/2015</a:t>
+              <a:t>4/8/2015</a:t>
             </a:fld>
             <a:endParaRPr lang="en-US" dirty="0"/>
           </a:p>
@@ -2255,7 +2255,7 @@
           <a:p>
             <a:fld id="{B94C08E3-C689-4D6B-B707-E33CF0BCC676}" type="datetimeFigureOut">
               <a:rPr lang="en-US" smtClean="0"/>
-              <a:t>4/6/2015</a:t>
+              <a:t>4/8/2015</a:t>
             </a:fld>
             <a:endParaRPr lang="en-US" dirty="0"/>
           </a:p>
@@ -2508,7 +2508,7 @@
           <a:p>
             <a:fld id="{B94C08E3-C689-4D6B-B707-E33CF0BCC676}" type="datetimeFigureOut">
               <a:rPr lang="en-US" smtClean="0"/>
-              <a:t>4/6/2015</a:t>
+              <a:t>4/8/2015</a:t>
             </a:fld>
             <a:endParaRPr lang="en-US" dirty="0"/>
           </a:p>
@@ -2721,7 +2721,7 @@
           <a:p>
             <a:fld id="{B94C08E3-C689-4D6B-B707-E33CF0BCC676}" type="datetimeFigureOut">
               <a:rPr lang="en-US" smtClean="0"/>
-              <a:t>4/6/2015</a:t>
+              <a:t>4/8/2015</a:t>
             </a:fld>
             <a:endParaRPr lang="en-US" dirty="0"/>
           </a:p>
@@ -3600,10 +3600,24 @@
           </a:p>
           <a:p>
             <a:r>
+              <a:rPr lang="en-US" sz="1400">
+                <a:hlinkClick r:id="rId2"/>
+              </a:rPr>
+              <a:t>https://github.com/ManuelDeLeon/AllAboutReactivity</a:t>
+            </a:r>
+          </a:p>
+          <a:p>
+            <a:r>
               <a:rPr lang="en-US" sz="1400" smtClean="0">
                 <a:hlinkClick r:id="rId2"/>
               </a:rPr>
-              <a:t>https://www.meteor.com/tracker</a:t>
+              <a:t>https</a:t>
+            </a:r>
+            <a:r>
+              <a:rPr lang="en-US" sz="1400" smtClean="0">
+                <a:hlinkClick r:id="rId2"/>
+              </a:rPr>
+              <a:t>://www.meteor.com/tracker</a:t>
             </a:r>
           </a:p>
           <a:p>

</xml_diff>